<commit_message>
restructured folder and updated presentation
</commit_message>
<xml_diff>
--- a/AppDesign-IonicFramework.pptx
+++ b/AppDesign-IonicFramework.pptx
@@ -21,6 +21,7 @@
     <p:sldId id="270" r:id="rId15"/>
     <p:sldId id="271" r:id="rId16"/>
     <p:sldId id="272" r:id="rId17"/>
+    <p:sldId id="273" r:id="rId18"/>
   </p:sldIdLst>
   <p:sldSz cx="12192000" cy="6858000"/>
   <p:notesSz cx="6858000" cy="9144000"/>
@@ -119,6 +120,11 @@
       </a:defRPr>
     </a:lvl9pPr>
   </p:defaultTextStyle>
+  <p:extLst>
+    <p:ext uri="{EFAFB233-063F-42B5-8137-9DF3F51BA10A}">
+      <p15:sldGuideLst xmlns:p15="http://schemas.microsoft.com/office/powerpoint/2012/main"/>
+    </p:ext>
+  </p:extLst>
 </p:presentation>
 </file>
 
@@ -314,7 +320,7 @@
             <a:fld id="{B61BEF0D-F0BB-DE4B-95CE-6DB70DBA9567}" type="datetimeFigureOut">
               <a:rPr lang="en-US" dirty="0"/>
               <a:pPr/>
-              <a:t>9/10/2015</a:t>
+              <a:t>9/14/2015</a:t>
             </a:fld>
             <a:endParaRPr lang="en-US" dirty="0"/>
           </a:p>
@@ -747,7 +753,7 @@
             <a:fld id="{B61BEF0D-F0BB-DE4B-95CE-6DB70DBA9567}" type="datetimeFigureOut">
               <a:rPr lang="en-US" dirty="0"/>
               <a:pPr/>
-              <a:t>9/10/2015</a:t>
+              <a:t>9/14/2015</a:t>
             </a:fld>
             <a:endParaRPr lang="en-US" dirty="0"/>
           </a:p>
@@ -994,7 +1000,7 @@
             <a:fld id="{B61BEF0D-F0BB-DE4B-95CE-6DB70DBA9567}" type="datetimeFigureOut">
               <a:rPr lang="en-US" dirty="0"/>
               <a:pPr/>
-              <a:t>9/10/2015</a:t>
+              <a:t>9/14/2015</a:t>
             </a:fld>
             <a:endParaRPr lang="en-US" dirty="0"/>
           </a:p>
@@ -1299,7 +1305,7 @@
             <a:fld id="{B61BEF0D-F0BB-DE4B-95CE-6DB70DBA9567}" type="datetimeFigureOut">
               <a:rPr lang="en-US" dirty="0"/>
               <a:pPr/>
-              <a:t>9/10/2015</a:t>
+              <a:t>9/14/2015</a:t>
             </a:fld>
             <a:endParaRPr lang="en-US" dirty="0"/>
           </a:p>
@@ -1614,7 +1620,7 @@
             <a:fld id="{B61BEF0D-F0BB-DE4B-95CE-6DB70DBA9567}" type="datetimeFigureOut">
               <a:rPr lang="en-US" dirty="0"/>
               <a:pPr/>
-              <a:t>9/10/2015</a:t>
+              <a:t>9/14/2015</a:t>
             </a:fld>
             <a:endParaRPr lang="en-US" dirty="0"/>
           </a:p>
@@ -1913,7 +1919,7 @@
             <a:fld id="{B61BEF0D-F0BB-DE4B-95CE-6DB70DBA9567}" type="datetimeFigureOut">
               <a:rPr lang="en-US" dirty="0"/>
               <a:pPr/>
-              <a:t>9/10/2015</a:t>
+              <a:t>9/14/2015</a:t>
             </a:fld>
             <a:endParaRPr lang="en-US" dirty="0"/>
           </a:p>
@@ -2277,7 +2283,7 @@
             <a:fld id="{B61BEF0D-F0BB-DE4B-95CE-6DB70DBA9567}" type="datetimeFigureOut">
               <a:rPr lang="en-US" dirty="0"/>
               <a:pPr/>
-              <a:t>9/10/2015</a:t>
+              <a:t>9/14/2015</a:t>
             </a:fld>
             <a:endParaRPr lang="en-US" dirty="0"/>
           </a:p>
@@ -2448,7 +2454,7 @@
             <a:fld id="{B61BEF0D-F0BB-DE4B-95CE-6DB70DBA9567}" type="datetimeFigureOut">
               <a:rPr lang="en-US" dirty="0"/>
               <a:pPr/>
-              <a:t>9/10/2015</a:t>
+              <a:t>9/14/2015</a:t>
             </a:fld>
             <a:endParaRPr lang="en-US" dirty="0"/>
           </a:p>
@@ -2625,7 +2631,7 @@
             <a:fld id="{B61BEF0D-F0BB-DE4B-95CE-6DB70DBA9567}" type="datetimeFigureOut">
               <a:rPr lang="en-US" dirty="0"/>
               <a:pPr/>
-              <a:t>9/10/2015</a:t>
+              <a:t>9/14/2015</a:t>
             </a:fld>
             <a:endParaRPr lang="en-US" dirty="0"/>
           </a:p>
@@ -2792,7 +2798,7 @@
             <a:fld id="{B61BEF0D-F0BB-DE4B-95CE-6DB70DBA9567}" type="datetimeFigureOut">
               <a:rPr lang="en-US" dirty="0"/>
               <a:pPr/>
-              <a:t>9/10/2015</a:t>
+              <a:t>9/14/2015</a:t>
             </a:fld>
             <a:endParaRPr lang="en-US" dirty="0"/>
           </a:p>
@@ -3039,7 +3045,7 @@
             <a:fld id="{B61BEF0D-F0BB-DE4B-95CE-6DB70DBA9567}" type="datetimeFigureOut">
               <a:rPr lang="en-US" dirty="0"/>
               <a:pPr/>
-              <a:t>9/10/2015</a:t>
+              <a:t>9/14/2015</a:t>
             </a:fld>
             <a:endParaRPr lang="en-US" dirty="0"/>
           </a:p>
@@ -3272,7 +3278,7 @@
             <a:fld id="{B61BEF0D-F0BB-DE4B-95CE-6DB70DBA9567}" type="datetimeFigureOut">
               <a:rPr lang="en-US" dirty="0"/>
               <a:pPr/>
-              <a:t>9/10/2015</a:t>
+              <a:t>9/14/2015</a:t>
             </a:fld>
             <a:endParaRPr lang="en-US" dirty="0"/>
           </a:p>
@@ -3651,7 +3657,7 @@
             <a:fld id="{B61BEF0D-F0BB-DE4B-95CE-6DB70DBA9567}" type="datetimeFigureOut">
               <a:rPr lang="en-US" dirty="0"/>
               <a:pPr/>
-              <a:t>9/10/2015</a:t>
+              <a:t>9/14/2015</a:t>
             </a:fld>
             <a:endParaRPr lang="en-US" dirty="0"/>
           </a:p>
@@ -3766,7 +3772,7 @@
             <a:fld id="{B61BEF0D-F0BB-DE4B-95CE-6DB70DBA9567}" type="datetimeFigureOut">
               <a:rPr lang="en-US" dirty="0"/>
               <a:pPr/>
-              <a:t>9/10/2015</a:t>
+              <a:t>9/14/2015</a:t>
             </a:fld>
             <a:endParaRPr lang="en-US" dirty="0"/>
           </a:p>
@@ -3858,7 +3864,7 @@
             <a:fld id="{B61BEF0D-F0BB-DE4B-95CE-6DB70DBA9567}" type="datetimeFigureOut">
               <a:rPr lang="en-US" dirty="0"/>
               <a:pPr/>
-              <a:t>9/10/2015</a:t>
+              <a:t>9/14/2015</a:t>
             </a:fld>
             <a:endParaRPr lang="en-US" dirty="0"/>
           </a:p>
@@ -4110,7 +4116,7 @@
             <a:fld id="{B61BEF0D-F0BB-DE4B-95CE-6DB70DBA9567}" type="datetimeFigureOut">
               <a:rPr lang="en-US" dirty="0"/>
               <a:pPr/>
-              <a:t>9/10/2015</a:t>
+              <a:t>9/14/2015</a:t>
             </a:fld>
             <a:endParaRPr lang="en-US" dirty="0"/>
           </a:p>
@@ -4390,7 +4396,7 @@
             <a:fld id="{B61BEF0D-F0BB-DE4B-95CE-6DB70DBA9567}" type="datetimeFigureOut">
               <a:rPr lang="en-US" dirty="0"/>
               <a:pPr/>
-              <a:t>9/10/2015</a:t>
+              <a:t>9/14/2015</a:t>
             </a:fld>
             <a:endParaRPr lang="en-US" dirty="0"/>
           </a:p>
@@ -4793,7 +4799,7 @@
             <a:fld id="{B61BEF0D-F0BB-DE4B-95CE-6DB70DBA9567}" type="datetimeFigureOut">
               <a:rPr lang="en-US" dirty="0"/>
               <a:pPr/>
-              <a:t>9/10/2015</a:t>
+              <a:t>9/14/2015</a:t>
             </a:fld>
             <a:endParaRPr lang="en-US" dirty="0"/>
           </a:p>
@@ -5374,12 +5380,12 @@
               <a:t>APP DESIGN AND </a:t>
             </a:r>
             <a:r>
-              <a:rPr lang="en-US" sz="3600" dirty="0" err="1" smtClean="0"/>
-              <a:t>DEVELoPMENT</a:t>
-            </a:r>
-            <a:r>
               <a:rPr lang="en-US" sz="3600" dirty="0" smtClean="0"/>
-              <a:t> WITH </a:t>
+              <a:t>Development </a:t>
+            </a:r>
+            <a:r>
+              <a:rPr lang="en-US" sz="3600" dirty="0" smtClean="0"/>
+              <a:t>WITH </a:t>
             </a:r>
             <a:br>
               <a:rPr lang="en-US" sz="3600" dirty="0" smtClean="0"/>
@@ -5404,8 +5410,8 @@
         </p:nvSpPr>
         <p:spPr>
           <a:xfrm>
-            <a:off x="684212" y="5319252"/>
-            <a:ext cx="6400800" cy="1179872"/>
+            <a:off x="684212" y="5852160"/>
+            <a:ext cx="6400800" cy="646964"/>
           </a:xfrm>
         </p:spPr>
         <p:txBody>
@@ -5415,7 +5421,7 @@
           <a:lstStyle/>
           <a:p>
             <a:r>
-              <a:rPr lang="en-US" sz="1800" dirty="0" smtClean="0">
+              <a:rPr lang="en-US" sz="1200" dirty="0" smtClean="0">
                 <a:solidFill>
                   <a:schemeClr val="tx1"/>
                 </a:solidFill>
@@ -5425,7 +5431,7 @@
           </a:p>
           <a:p>
             <a:r>
-              <a:rPr lang="en-US" sz="1800" dirty="0">
+              <a:rPr lang="en-US" sz="1200" dirty="0">
                 <a:solidFill>
                   <a:schemeClr val="tx1"/>
                 </a:solidFill>
@@ -5481,7 +5487,7 @@
         <p:spPr>
           <a:xfrm>
             <a:off x="733372" y="4106492"/>
-            <a:ext cx="3313728" cy="369332"/>
+            <a:ext cx="3663182" cy="400110"/>
           </a:xfrm>
           <a:prstGeom prst="rect">
             <a:avLst/>
@@ -5495,16 +5501,9 @@
           <a:lstStyle/>
           <a:p>
             <a:r>
-              <a:rPr lang="en-US" dirty="0">
-                <a:solidFill>
-                  <a:schemeClr val="tx1">
-                    <a:lumMod val="75000"/>
-                  </a:schemeClr>
-                </a:solidFill>
-              </a:rPr>
+              <a:rPr lang="en-US" sz="2000" dirty="0"/>
               <a:t>http://ionicframework.com/</a:t>
             </a:r>
-            <a:endParaRPr lang="en-US" dirty="0"/>
           </a:p>
         </p:txBody>
       </p:sp>
@@ -8741,6 +8740,132 @@
     <p:extLst>
       <p:ext uri="{BB962C8B-B14F-4D97-AF65-F5344CB8AC3E}">
         <p14:creationId xmlns:p14="http://schemas.microsoft.com/office/powerpoint/2010/main" val="2547915515"/>
+      </p:ext>
+    </p:extLst>
+  </p:cSld>
+  <p:clrMapOvr>
+    <a:masterClrMapping/>
+  </p:clrMapOvr>
+  <p:timing>
+    <p:tnLst>
+      <p:par>
+        <p:cTn id="1" dur="indefinite" restart="never" nodeType="tmRoot"/>
+      </p:par>
+    </p:tnLst>
+  </p:timing>
+</p:sld>
+</file>
+
+<file path=ppt/slides/slide17.xml><?xml version="1.0" encoding="utf-8"?>
+<p:sld xmlns:a="http://schemas.openxmlformats.org/drawingml/2006/main" xmlns:r="http://schemas.openxmlformats.org/officeDocument/2006/relationships" xmlns:p="http://schemas.openxmlformats.org/presentationml/2006/main">
+  <p:cSld>
+    <p:bg>
+      <p:bgPr>
+        <a:solidFill>
+          <a:schemeClr val="tx1"/>
+        </a:solidFill>
+        <a:effectLst/>
+      </p:bgPr>
+    </p:bg>
+    <p:spTree>
+      <p:nvGrpSpPr>
+        <p:cNvPr id="1" name=""/>
+        <p:cNvGrpSpPr/>
+        <p:nvPr/>
+      </p:nvGrpSpPr>
+      <p:grpSpPr>
+        <a:xfrm>
+          <a:off x="0" y="0"/>
+          <a:ext cx="0" cy="0"/>
+          <a:chOff x="0" y="0"/>
+          <a:chExt cx="0" cy="0"/>
+        </a:xfrm>
+      </p:grpSpPr>
+      <p:sp>
+        <p:nvSpPr>
+          <p:cNvPr id="3" name="TextBox 2"/>
+          <p:cNvSpPr txBox="1"/>
+          <p:nvPr/>
+        </p:nvSpPr>
+        <p:spPr>
+          <a:xfrm>
+            <a:off x="790575" y="438614"/>
+            <a:ext cx="10603644" cy="369332"/>
+          </a:xfrm>
+          <a:prstGeom prst="rect">
+            <a:avLst/>
+          </a:prstGeom>
+          <a:noFill/>
+        </p:spPr>
+        <p:txBody>
+          <a:bodyPr wrap="square" rtlCol="0">
+            <a:spAutoFit/>
+          </a:bodyPr>
+          <a:lstStyle/>
+          <a:p>
+            <a:pPr lvl="0"/>
+            <a:r>
+              <a:rPr lang="en-US" b="1" dirty="0" smtClean="0">
+                <a:solidFill>
+                  <a:schemeClr val="bg1">
+                    <a:lumMod val="75000"/>
+                    <a:lumOff val="25000"/>
+                  </a:schemeClr>
+                </a:solidFill>
+              </a:rPr>
+              <a:t>Downloads</a:t>
+            </a:r>
+            <a:endParaRPr lang="en-US" b="1" dirty="0" smtClean="0">
+              <a:solidFill>
+                <a:schemeClr val="bg1">
+                  <a:lumMod val="75000"/>
+                  <a:lumOff val="25000"/>
+                </a:schemeClr>
+              </a:solidFill>
+            </a:endParaRPr>
+          </a:p>
+        </p:txBody>
+      </p:sp>
+      <p:sp>
+        <p:nvSpPr>
+          <p:cNvPr id="4" name="TextBox 3"/>
+          <p:cNvSpPr txBox="1"/>
+          <p:nvPr/>
+        </p:nvSpPr>
+        <p:spPr>
+          <a:xfrm>
+            <a:off x="790575" y="1009816"/>
+            <a:ext cx="5953874" cy="369332"/>
+          </a:xfrm>
+          <a:prstGeom prst="rect">
+            <a:avLst/>
+          </a:prstGeom>
+          <a:noFill/>
+        </p:spPr>
+        <p:txBody>
+          <a:bodyPr wrap="none" rtlCol="0">
+            <a:spAutoFit/>
+          </a:bodyPr>
+          <a:lstStyle/>
+          <a:p>
+            <a:r>
+              <a:rPr lang="en-US" dirty="0">
+                <a:solidFill>
+                  <a:schemeClr val="bg1">
+                    <a:lumMod val="75000"/>
+                    <a:lumOff val="25000"/>
+                  </a:schemeClr>
+                </a:solidFill>
+              </a:rPr>
+              <a:t>https://github.com/ChuckLeone/ionic-presentation</a:t>
+            </a:r>
+          </a:p>
+        </p:txBody>
+      </p:sp>
+    </p:spTree>
+    <p:extLst>
+      <p:ext uri="{BB962C8B-B14F-4D97-AF65-F5344CB8AC3E}">
+        <p14:creationId xmlns:p14="http://schemas.microsoft.com/office/powerpoint/2010/main" val="2524395307"/>
       </p:ext>
     </p:extLst>
   </p:cSld>

</xml_diff>